<commit_message>
write all PZ & some refactor
</commit_message>
<xml_diff>
--- a/КП Презентация Абрамов.pptx
+++ b/КП Презентация Абрамов.pptx
@@ -5569,13 +5569,6 @@
               <a:t>подсистемы</a:t>
             </a:r>
             <a:r>
-              <a:rPr lang="ru-RU" altLang="en-US">
-                <a:latin typeface="Arial" panose="020B0604020202020204" pitchFamily="34" charset="0"/>
-                <a:cs typeface="Arial" panose="020B0604020202020204" pitchFamily="34" charset="0"/>
-              </a:rPr>
-              <a:t>,</a:t>
-            </a:r>
-            <a:r>
               <a:rPr lang="en-US" altLang="ru-RU">
                 <a:latin typeface="Arial" panose="020B0604020202020204" pitchFamily="34" charset="0"/>
                 <a:cs typeface="Arial" panose="020B0604020202020204" pitchFamily="34" charset="0"/>
@@ -5723,11 +5716,11 @@
               <a:t> </a:t>
             </a:r>
             <a:r>
-              <a:rPr lang="ru-RU" altLang="en-US">
-                <a:latin typeface="Arial" panose="020B0604020202020204" pitchFamily="34" charset="0"/>
-                <a:cs typeface="Arial" panose="020B0604020202020204" pitchFamily="34" charset="0"/>
-              </a:rPr>
-              <a:t>заказами</a:t>
+              <a:rPr lang="en-US" altLang="en-US">
+                <a:latin typeface="Arial" panose="020B0604020202020204" pitchFamily="34" charset="0"/>
+                <a:cs typeface="Arial" panose="020B0604020202020204" pitchFamily="34" charset="0"/>
+              </a:rPr>
+              <a:t>ими</a:t>
             </a:r>
             <a:r>
               <a:rPr lang="en-US" altLang="ru-RU">
@@ -6534,6 +6527,78 @@
           </a:p>
         </p:txBody>
       </p:sp>
+      <p:pic>
+        <p:nvPicPr>
+          <p:cNvPr id="5" name="Изображение 4" descr="icons8-hierarchy-96"/>
+          <p:cNvPicPr>
+            <a:picLocks noChangeAspect="1"/>
+          </p:cNvPicPr>
+          <p:nvPr/>
+        </p:nvPicPr>
+        <p:blipFill>
+          <a:blip r:embed="rId1"/>
+          <a:stretch>
+            <a:fillRect/>
+          </a:stretch>
+        </p:blipFill>
+        <p:spPr>
+          <a:xfrm>
+            <a:off x="7679690" y="7089775"/>
+            <a:ext cx="1440000" cy="1440000"/>
+          </a:xfrm>
+          <a:prstGeom prst="rect">
+            <a:avLst/>
+          </a:prstGeom>
+        </p:spPr>
+      </p:pic>
+      <p:pic>
+        <p:nvPicPr>
+          <p:cNvPr id="7" name="Изображение 6" descr="icons8-backlog-100"/>
+          <p:cNvPicPr>
+            <a:picLocks noChangeAspect="1"/>
+          </p:cNvPicPr>
+          <p:nvPr/>
+        </p:nvPicPr>
+        <p:blipFill>
+          <a:blip r:embed="rId2"/>
+          <a:stretch>
+            <a:fillRect/>
+          </a:stretch>
+        </p:blipFill>
+        <p:spPr>
+          <a:xfrm>
+            <a:off x="5701665" y="7319645"/>
+            <a:ext cx="1440000" cy="1440000"/>
+          </a:xfrm>
+          <a:prstGeom prst="rect">
+            <a:avLst/>
+          </a:prstGeom>
+        </p:spPr>
+      </p:pic>
+      <p:pic>
+        <p:nvPicPr>
+          <p:cNvPr id="8" name="Изображение 7" descr="icons8-task-96"/>
+          <p:cNvPicPr>
+            <a:picLocks noChangeAspect="1"/>
+          </p:cNvPicPr>
+          <p:nvPr/>
+        </p:nvPicPr>
+        <p:blipFill>
+          <a:blip r:embed="rId3"/>
+          <a:stretch>
+            <a:fillRect/>
+          </a:stretch>
+        </p:blipFill>
+        <p:spPr>
+          <a:xfrm>
+            <a:off x="3143885" y="7089775"/>
+            <a:ext cx="1440000" cy="1440000"/>
+          </a:xfrm>
+          <a:prstGeom prst="rect">
+            <a:avLst/>
+          </a:prstGeom>
+        </p:spPr>
+      </p:pic>
       <p:grpSp>
         <p:nvGrpSpPr>
           <p:cNvPr id="19" name="Группа 18"/>
@@ -6628,7 +6693,7 @@
             <a:p>
               <a:pPr algn="l">
                 <a:buBlip>
-                  <a:blip r:embed="rId1"/>
+                  <a:blip r:embed="rId4"/>
                 </a:buBlip>
               </a:pPr>
               <a:r>
@@ -6696,7 +6761,7 @@
             <a:p>
               <a:pPr algn="l">
                 <a:buBlip>
-                  <a:blip r:embed="rId1"/>
+                  <a:blip r:embed="rId4"/>
                 </a:buBlip>
               </a:pPr>
               <a:r>
@@ -6809,7 +6874,7 @@
             <a:p>
               <a:pPr algn="l">
                 <a:buBlip>
-                  <a:blip r:embed="rId1"/>
+                  <a:blip r:embed="rId4"/>
                 </a:buBlip>
               </a:pPr>
               <a:r>
@@ -6953,7 +7018,7 @@
             <p:nvPr/>
           </p:nvPicPr>
           <p:blipFill>
-            <a:blip r:embed="rId2"/>
+            <a:blip r:embed="rId5"/>
             <a:stretch>
               <a:fillRect/>
             </a:stretch>
@@ -7063,7 +7128,7 @@
             <a:p>
               <a:pPr algn="l">
                 <a:buBlip>
-                  <a:blip r:embed="rId1"/>
+                  <a:blip r:embed="rId4"/>
                 </a:buBlip>
               </a:pPr>
               <a:r>
@@ -7177,7 +7242,7 @@
             <a:p>
               <a:pPr algn="l">
                 <a:buBlip>
-                  <a:blip r:embed="rId1"/>
+                  <a:blip r:embed="rId4"/>
                 </a:buBlip>
               </a:pPr>
               <a:r>
@@ -7241,7 +7306,7 @@
             <a:p>
               <a:pPr algn="l">
                 <a:buBlip>
-                  <a:blip r:embed="rId1"/>
+                  <a:blip r:embed="rId4"/>
                 </a:buBlip>
               </a:pPr>
               <a:r>
@@ -7313,7 +7378,7 @@
             <p:nvPr/>
           </p:nvPicPr>
           <p:blipFill>
-            <a:blip r:embed="rId3"/>
+            <a:blip r:embed="rId6"/>
             <a:stretch>
               <a:fillRect/>
             </a:stretch>
@@ -7417,7 +7482,7 @@
             <a:p>
               <a:pPr algn="l">
                 <a:buBlip>
-                  <a:blip r:embed="rId1"/>
+                  <a:blip r:embed="rId4"/>
                 </a:buBlip>
               </a:pPr>
               <a:r>
@@ -7501,7 +7566,7 @@
             <a:p>
               <a:pPr algn="l">
                 <a:buBlip>
-                  <a:blip r:embed="rId1"/>
+                  <a:blip r:embed="rId4"/>
                 </a:buBlip>
               </a:pPr>
               <a:r>
@@ -7567,7 +7632,7 @@
             <p:nvPr/>
           </p:nvPicPr>
           <p:blipFill>
-            <a:blip r:embed="rId4"/>
+            <a:blip r:embed="rId7"/>
             <a:stretch>
               <a:fillRect/>
             </a:stretch>
@@ -7697,7 +7762,7 @@
             <a:p>
               <a:pPr algn="l">
                 <a:buBlip>
-                  <a:blip r:embed="rId1"/>
+                  <a:blip r:embed="rId4"/>
                 </a:buBlip>
               </a:pPr>
               <a:r>
@@ -7781,7 +7846,7 @@
             <a:p>
               <a:pPr algn="l">
                 <a:buBlip>
-                  <a:blip r:embed="rId1"/>
+                  <a:blip r:embed="rId4"/>
                 </a:buBlip>
               </a:pPr>
               <a:r>
@@ -7873,7 +7938,7 @@
             <p:nvPr/>
           </p:nvPicPr>
           <p:blipFill>
-            <a:blip r:embed="rId5"/>
+            <a:blip r:embed="rId8"/>
             <a:stretch>
               <a:fillRect/>
             </a:stretch>
@@ -7891,6 +7956,30 @@
       </p:grpSp>
       <p:pic>
         <p:nvPicPr>
+          <p:cNvPr id="25" name="Изображение 24" descr="icons8-down-right-100 (1)"/>
+          <p:cNvPicPr>
+            <a:picLocks noChangeAspect="1"/>
+          </p:cNvPicPr>
+          <p:nvPr/>
+        </p:nvPicPr>
+        <p:blipFill>
+          <a:blip r:embed="rId9"/>
+          <a:stretch>
+            <a:fillRect/>
+          </a:stretch>
+        </p:blipFill>
+        <p:spPr>
+          <a:xfrm>
+            <a:off x="4511675" y="7041515"/>
+            <a:ext cx="1270000" cy="1270000"/>
+          </a:xfrm>
+          <a:prstGeom prst="rect">
+            <a:avLst/>
+          </a:prstGeom>
+        </p:spPr>
+      </p:pic>
+      <p:pic>
+        <p:nvPicPr>
           <p:cNvPr id="26" name="Изображение 25" descr="icons8-up-right-100"/>
           <p:cNvPicPr>
             <a:picLocks noChangeAspect="1"/>
@@ -7898,7 +7987,7 @@
           <p:nvPr/>
         </p:nvPicPr>
         <p:blipFill>
-          <a:blip r:embed="rId6"/>
+          <a:blip r:embed="rId10"/>
           <a:stretch>
             <a:fillRect/>
           </a:stretch>
@@ -7915,6 +8004,30 @@
       </p:pic>
       <p:pic>
         <p:nvPicPr>
+          <p:cNvPr id="27" name="Изображение 26" descr="icons8-up-left-100"/>
+          <p:cNvPicPr>
+            <a:picLocks noChangeAspect="1"/>
+          </p:cNvPicPr>
+          <p:nvPr/>
+        </p:nvPicPr>
+        <p:blipFill>
+          <a:blip r:embed="rId11"/>
+          <a:stretch>
+            <a:fillRect/>
+          </a:stretch>
+        </p:blipFill>
+        <p:spPr>
+          <a:xfrm rot="16200000">
+            <a:off x="1343025" y="6950710"/>
+            <a:ext cx="1270000" cy="1270000"/>
+          </a:xfrm>
+          <a:prstGeom prst="rect">
+            <a:avLst/>
+          </a:prstGeom>
+        </p:spPr>
+      </p:pic>
+      <p:pic>
+        <p:nvPicPr>
           <p:cNvPr id="28" name="Изображение 27" descr="icons8-down-left-arrow-100"/>
           <p:cNvPicPr>
             <a:picLocks noChangeAspect="1"/>
@@ -7922,7 +8035,7 @@
           <p:nvPr/>
         </p:nvPicPr>
         <p:blipFill>
-          <a:blip r:embed="rId7"/>
+          <a:blip r:embed="rId12"/>
           <a:stretch>
             <a:fillRect/>
           </a:stretch>
@@ -7946,7 +8059,7 @@
           <p:nvPr/>
         </p:nvPicPr>
         <p:blipFill>
-          <a:blip r:embed="rId6"/>
+          <a:blip r:embed="rId10"/>
           <a:stretch>
             <a:fillRect/>
           </a:stretch>

</xml_diff>